<commit_message>
updated LS for 2 new papers
</commit_message>
<xml_diff>
--- a/PPT/Review2.pptx
+++ b/PPT/Review2.pptx
@@ -24,9 +24,14 @@
     <p:sldId id="280" r:id="rId18"/>
     <p:sldId id="281" r:id="rId19"/>
     <p:sldId id="270" r:id="rId20"/>
-    <p:sldId id="271" r:id="rId21"/>
-    <p:sldId id="272" r:id="rId22"/>
-    <p:sldId id="273" r:id="rId23"/>
+    <p:sldId id="282" r:id="rId21"/>
+    <p:sldId id="283" r:id="rId22"/>
+    <p:sldId id="271" r:id="rId23"/>
+    <p:sldId id="286" r:id="rId24"/>
+    <p:sldId id="272" r:id="rId25"/>
+    <p:sldId id="273" r:id="rId26"/>
+    <p:sldId id="284" r:id="rId27"/>
+    <p:sldId id="285" r:id="rId28"/>
   </p:sldIdLst>
   <p:sldSz cx="12192000" cy="6858000"/>
   <p:notesSz cx="6858000" cy="9144000"/>
@@ -358,7 +363,7 @@
             <a:fld id="{5586B75A-687E-405C-8A0B-8D00578BA2C3}" type="datetimeFigureOut">
               <a:rPr lang="en-US" dirty="0"/>
               <a:pPr/>
-              <a:t>11/29/22</a:t>
+              <a:t>11/30/22</a:t>
             </a:fld>
             <a:endParaRPr lang="en-US" dirty="0"/>
           </a:p>
@@ -525,7 +530,7 @@
             <a:fld id="{5586B75A-687E-405C-8A0B-8D00578BA2C3}" type="datetimeFigureOut">
               <a:rPr lang="en-US" dirty="0"/>
               <a:pPr/>
-              <a:t>11/29/22</a:t>
+              <a:t>11/30/22</a:t>
             </a:fld>
             <a:endParaRPr lang="en-US" dirty="0"/>
           </a:p>
@@ -702,7 +707,7 @@
             <a:fld id="{5586B75A-687E-405C-8A0B-8D00578BA2C3}" type="datetimeFigureOut">
               <a:rPr lang="en-US" dirty="0"/>
               <a:pPr/>
-              <a:t>11/29/22</a:t>
+              <a:t>11/30/22</a:t>
             </a:fld>
             <a:endParaRPr lang="en-US" dirty="0"/>
           </a:p>
@@ -869,7 +874,7 @@
             <a:fld id="{5586B75A-687E-405C-8A0B-8D00578BA2C3}" type="datetimeFigureOut">
               <a:rPr lang="en-US" dirty="0"/>
               <a:pPr/>
-              <a:t>11/29/22</a:t>
+              <a:t>11/30/22</a:t>
             </a:fld>
             <a:endParaRPr lang="en-US" dirty="0"/>
           </a:p>
@@ -1124,7 +1129,7 @@
             <a:fld id="{5586B75A-687E-405C-8A0B-8D00578BA2C3}" type="datetimeFigureOut">
               <a:rPr lang="en-US" dirty="0"/>
               <a:pPr/>
-              <a:t>11/29/22</a:t>
+              <a:t>11/30/22</a:t>
             </a:fld>
             <a:endParaRPr lang="en-US" dirty="0"/>
           </a:p>
@@ -1409,7 +1414,7 @@
             <a:fld id="{5586B75A-687E-405C-8A0B-8D00578BA2C3}" type="datetimeFigureOut">
               <a:rPr lang="en-US" dirty="0"/>
               <a:pPr/>
-              <a:t>11/29/22</a:t>
+              <a:t>11/30/22</a:t>
             </a:fld>
             <a:endParaRPr lang="en-US" dirty="0"/>
           </a:p>
@@ -1848,7 +1853,7 @@
             <a:fld id="{5586B75A-687E-405C-8A0B-8D00578BA2C3}" type="datetimeFigureOut">
               <a:rPr lang="en-US" dirty="0"/>
               <a:pPr/>
-              <a:t>11/29/22</a:t>
+              <a:t>11/30/22</a:t>
             </a:fld>
             <a:endParaRPr lang="en-US" dirty="0"/>
           </a:p>
@@ -1963,7 +1968,7 @@
             <a:fld id="{5586B75A-687E-405C-8A0B-8D00578BA2C3}" type="datetimeFigureOut">
               <a:rPr lang="en-US" dirty="0"/>
               <a:pPr/>
-              <a:t>11/29/22</a:t>
+              <a:t>11/30/22</a:t>
             </a:fld>
             <a:endParaRPr lang="en-US" dirty="0"/>
           </a:p>
@@ -2055,7 +2060,7 @@
             <a:fld id="{5586B75A-687E-405C-8A0B-8D00578BA2C3}" type="datetimeFigureOut">
               <a:rPr lang="en-US" dirty="0"/>
               <a:pPr/>
-              <a:t>11/29/22</a:t>
+              <a:t>11/30/22</a:t>
             </a:fld>
             <a:endParaRPr lang="en-US" dirty="0"/>
           </a:p>
@@ -2340,7 +2345,7 @@
             <a:fld id="{5586B75A-687E-405C-8A0B-8D00578BA2C3}" type="datetimeFigureOut">
               <a:rPr lang="en-US" dirty="0"/>
               <a:pPr/>
-              <a:t>11/29/22</a:t>
+              <a:t>11/30/22</a:t>
             </a:fld>
             <a:endParaRPr lang="en-US" dirty="0"/>
           </a:p>
@@ -2610,7 +2615,7 @@
             <a:fld id="{5586B75A-687E-405C-8A0B-8D00578BA2C3}" type="datetimeFigureOut">
               <a:rPr lang="en-US" dirty="0"/>
               <a:pPr/>
-              <a:t>11/29/22</a:t>
+              <a:t>11/30/22</a:t>
             </a:fld>
             <a:endParaRPr lang="en-US" dirty="0"/>
           </a:p>
@@ -2904,7 +2909,7 @@
             <a:fld id="{5586B75A-687E-405C-8A0B-8D00578BA2C3}" type="datetimeFigureOut">
               <a:rPr lang="en-US" dirty="0"/>
               <a:pPr/>
-              <a:t>11/29/22</a:t>
+              <a:t>11/30/22</a:t>
             </a:fld>
             <a:endParaRPr lang="en-US" dirty="0"/>
           </a:p>
@@ -3590,7 +3595,7 @@
           <a:p>
             <a:r>
               <a:rPr lang="en-US" sz="1800" dirty="0"/>
-              <a:t>Date : 09.11.2022</a:t>
+              <a:t>Date : 07.12.2022</a:t>
             </a:r>
           </a:p>
         </p:txBody>
@@ -4259,7 +4264,7 @@
           <a:p>
             <a:r>
               <a:rPr lang="en-US" sz="1800" dirty="0"/>
-              <a:t>M.Tech - Study Oriented Project Review - 1</a:t>
+              <a:t>M.Tech - Study Oriented Project Review - 2</a:t>
             </a:r>
           </a:p>
         </p:txBody>
@@ -5971,10 +5976,33 @@
           </a:xfrm>
         </p:spPr>
         <p:txBody>
-          <a:bodyPr anchor="t"/>
+          <a:bodyPr anchor="t">
+            <a:normAutofit/>
+          </a:bodyPr>
           <a:lstStyle/>
           <a:p>
-            <a:endParaRPr lang="en-US" dirty="0"/>
+            <a:r>
+              <a:rPr lang="en-US" sz="1600" dirty="0"/>
+              <a:t>This study aims to generate a reliable artificial model capable of detecting the high risk of AD, based on gene expression array collected from blood samples.</a:t>
+            </a:r>
+          </a:p>
+          <a:p>
+            <a:r>
+              <a:rPr lang="en-US" sz="1600" dirty="0"/>
+              <a:t>Single dimension gene expression is converted into a discriminative 2D image which is then used by the CNN model for classification.</a:t>
+            </a:r>
+          </a:p>
+          <a:p>
+            <a:r>
+              <a:rPr lang="en-US" sz="1600" dirty="0"/>
+              <a:t>Study is conducted using 11.618 common genes expression values which are categorized based on Fisher distance.</a:t>
+            </a:r>
+          </a:p>
+          <a:p>
+            <a:r>
+              <a:rPr lang="en-US" sz="1600" dirty="0"/>
+              <a:t>Proposed method of 2D conversion of gene expression was found to have a unique advantage for improving accuracy and can be easily transferred to the clinic to drastically improve AD early detection.</a:t>
+            </a:r>
           </a:p>
         </p:txBody>
       </p:sp>
@@ -6009,9 +6037,9 @@
             <a:r>
               <a:rPr lang="en-IN" sz="2200" b="0" i="0" dirty="0">
                 <a:effectLst/>
-                <a:latin typeface="Arial" panose="020B0604020202020204" pitchFamily="34" charset="0"/>
+                <a:latin typeface="+mj-lt"/>
               </a:rPr>
-              <a:t>Detection of Novel Biomarker Genes of Alzheimer’s Disease Using Gene Expression Data, </a:t>
+              <a:t>Prediction of Alzheimer’s Disease by a Novel Image-Based Representation of Gene Expression, </a:t>
             </a:r>
             <a:r>
               <a:rPr lang="en-IN" sz="1400" b="0" i="0" dirty="0">
@@ -6022,9 +6050,9 @@
                   </a:schemeClr>
                 </a:solidFill>
                 <a:effectLst/>
-                <a:latin typeface="Arial" panose="020B0604020202020204" pitchFamily="34" charset="0"/>
+                <a:latin typeface="+mj-lt"/>
               </a:rPr>
-              <a:t>Shehan Perera, Kaveesha Hewage, Chamara Gunarathne, Rajitha Navathana, Damayanthi Herath, Roshan G. Ragel, IEEE - 2020</a:t>
+              <a:t>Habil Kalkan, Umit Murat Akkaya, Guldal Inal-Gultekin and Ana Maria Sanchez-Perez - MDPI - 2022</a:t>
             </a:r>
             <a:endParaRPr lang="en-US" sz="1400" dirty="0">
               <a:solidFill>
@@ -6033,10 +6061,41 @@
                   <a:lumOff val="35000"/>
                 </a:schemeClr>
               </a:solidFill>
+              <a:latin typeface="+mj-lt"/>
             </a:endParaRPr>
           </a:p>
         </p:txBody>
       </p:sp>
+      <p:pic>
+        <p:nvPicPr>
+          <p:cNvPr id="2" name="Picture 1">
+            <a:extLst>
+              <a:ext uri="{FF2B5EF4-FFF2-40B4-BE49-F238E27FC236}">
+                <a16:creationId xmlns:a16="http://schemas.microsoft.com/office/drawing/2014/main" id="{8586ACB9-7E3E-4CA3-6F30-94D9517BEA30}"/>
+              </a:ext>
+            </a:extLst>
+          </p:cNvPr>
+          <p:cNvPicPr>
+            <a:picLocks noChangeAspect="1"/>
+          </p:cNvPicPr>
+          <p:nvPr/>
+        </p:nvPicPr>
+        <p:blipFill>
+          <a:blip r:embed="rId2"/>
+          <a:stretch>
+            <a:fillRect/>
+          </a:stretch>
+        </p:blipFill>
+        <p:spPr>
+          <a:xfrm>
+            <a:off x="3867912" y="4473556"/>
+            <a:ext cx="7772400" cy="1687122"/>
+          </a:xfrm>
+          <a:prstGeom prst="rect">
+            <a:avLst/>
+          </a:prstGeom>
+        </p:spPr>
+      </p:pic>
     </p:spTree>
     <p:extLst>
       <p:ext uri="{BB962C8B-B14F-4D97-AF65-F5344CB8AC3E}">
@@ -6177,10 +6236,10 @@
       </p:grpSpPr>
       <p:sp>
         <p:nvSpPr>
-          <p:cNvPr id="4" name="Content Placeholder 3">
+          <p:cNvPr id="3" name="Content Placeholder 2">
             <a:extLst>
               <a:ext uri="{FF2B5EF4-FFF2-40B4-BE49-F238E27FC236}">
-                <a16:creationId xmlns:a16="http://schemas.microsoft.com/office/drawing/2014/main" id="{E977BF4A-8DEA-7C9D-394F-F1DC4FDABF63}"/>
+                <a16:creationId xmlns:a16="http://schemas.microsoft.com/office/drawing/2014/main" id="{6D8D15E0-F98B-442B-F5B6-87AF7DA7A003}"/>
               </a:ext>
             </a:extLst>
           </p:cNvPr>
@@ -6188,86 +6247,87 @@
             <a:spLocks noGrp="1"/>
           </p:cNvSpPr>
           <p:nvPr>
-            <p:ph sz="half" idx="2"/>
-          </p:nvPr>
-        </p:nvSpPr>
+            <p:ph idx="1"/>
+          </p:nvPr>
+        </p:nvSpPr>
+        <p:spPr/>
+        <p:txBody>
+          <a:bodyPr anchor="t"/>
+          <a:lstStyle/>
+          <a:p>
+            <a:r>
+              <a:rPr lang="en-US" sz="1600" dirty="0"/>
+              <a:t>Method:</a:t>
+            </a:r>
+          </a:p>
+          <a:p>
+            <a:pPr marL="0" indent="0">
+              <a:buNone/>
+            </a:pPr>
+            <a:endParaRPr lang="en-US" sz="1600" dirty="0"/>
+          </a:p>
+          <a:p>
+            <a:pPr lvl="1"/>
+            <a:r>
+              <a:rPr lang="en-US" sz="1600" dirty="0"/>
+              <a:t>Dataset and Data Preprocessing: datasets were extracted from NCBI, GSE63060, GSE63062 and GSE140829. All these datasets were combined, and values were min-max normalized.</a:t>
+            </a:r>
+          </a:p>
+          <a:p>
+            <a:pPr marL="502920" lvl="1" indent="0">
+              <a:buNone/>
+            </a:pPr>
+            <a:endParaRPr lang="en-US" sz="1600" dirty="0"/>
+          </a:p>
+          <a:p>
+            <a:pPr lvl="1"/>
+            <a:r>
+              <a:rPr lang="en-US" sz="1600" dirty="0"/>
+              <a:t>Image-Based Representation of mRNA Expression: LASSO regression is used to eliminate irrelevant genes for AD. Linear discriminant analysis is used to determine the position of gene in the 2D space.</a:t>
+            </a:r>
+          </a:p>
+          <a:p>
+            <a:pPr marL="502920" lvl="1" indent="0">
+              <a:buNone/>
+            </a:pPr>
+            <a:endParaRPr lang="en-US" dirty="0"/>
+          </a:p>
+        </p:txBody>
+      </p:sp>
+      <p:pic>
+        <p:nvPicPr>
+          <p:cNvPr id="4" name="Picture 3">
+            <a:extLst>
+              <a:ext uri="{FF2B5EF4-FFF2-40B4-BE49-F238E27FC236}">
+                <a16:creationId xmlns:a16="http://schemas.microsoft.com/office/drawing/2014/main" id="{BE20BF0C-2B82-725D-B4FB-685DD0A7715E}"/>
+              </a:ext>
+            </a:extLst>
+          </p:cNvPr>
+          <p:cNvPicPr>
+            <a:picLocks noChangeAspect="1"/>
+          </p:cNvPicPr>
+          <p:nvPr/>
+        </p:nvPicPr>
+        <p:blipFill>
+          <a:blip r:embed="rId2"/>
+          <a:stretch>
+            <a:fillRect/>
+          </a:stretch>
+        </p:blipFill>
         <p:spPr>
           <a:xfrm>
-            <a:off x="3867912" y="1911096"/>
-            <a:ext cx="7772400" cy="4043200"/>
-          </a:xfrm>
-        </p:spPr>
-        <p:txBody>
-          <a:bodyPr anchor="t"/>
-          <a:lstStyle/>
-          <a:p>
-            <a:endParaRPr lang="en-US" dirty="0"/>
-          </a:p>
-        </p:txBody>
-      </p:sp>
-      <p:sp>
-        <p:nvSpPr>
-          <p:cNvPr id="9" name="TextBox 8">
-            <a:extLst>
-              <a:ext uri="{FF2B5EF4-FFF2-40B4-BE49-F238E27FC236}">
-                <a16:creationId xmlns:a16="http://schemas.microsoft.com/office/drawing/2014/main" id="{008F78EE-1CBC-BA30-6AF8-D86E756276C1}"/>
-              </a:ext>
-            </a:extLst>
-          </p:cNvPr>
-          <p:cNvSpPr txBox="1"/>
-          <p:nvPr/>
-        </p:nvSpPr>
-        <p:spPr>
-          <a:xfrm>
-            <a:off x="3867912" y="804672"/>
-            <a:ext cx="7772400" cy="984885"/>
+            <a:off x="3540290" y="3645704"/>
+            <a:ext cx="8148947" cy="1623293"/>
           </a:xfrm>
           <a:prstGeom prst="rect">
             <a:avLst/>
           </a:prstGeom>
-          <a:noFill/>
         </p:spPr>
-        <p:txBody>
-          <a:bodyPr wrap="square" rtlCol="0">
-            <a:spAutoFit/>
-          </a:bodyPr>
-          <a:lstStyle/>
-          <a:p>
-            <a:r>
-              <a:rPr lang="en-IN" sz="2200" b="0" i="0" dirty="0">
-                <a:effectLst/>
-                <a:latin typeface="Arial" panose="020B0604020202020204" pitchFamily="34" charset="0"/>
-              </a:rPr>
-              <a:t>Detection of Novel Biomarker Genes of Alzheimer’s Disease Using Gene Expression Data, </a:t>
-            </a:r>
-            <a:r>
-              <a:rPr lang="en-IN" sz="1400" b="0" i="0" dirty="0">
-                <a:solidFill>
-                  <a:schemeClr val="tx1">
-                    <a:lumMod val="65000"/>
-                    <a:lumOff val="35000"/>
-                  </a:schemeClr>
-                </a:solidFill>
-                <a:effectLst/>
-                <a:latin typeface="Arial" panose="020B0604020202020204" pitchFamily="34" charset="0"/>
-              </a:rPr>
-              <a:t>Shehan Perera, Kaveesha Hewage, Chamara Gunarathne, Rajitha Navathana, Damayanthi Herath, Roshan G. Ragel, IEEE - 2020</a:t>
-            </a:r>
-            <a:endParaRPr lang="en-US" sz="1400" dirty="0">
-              <a:solidFill>
-                <a:schemeClr val="tx1">
-                  <a:lumMod val="65000"/>
-                  <a:lumOff val="35000"/>
-                </a:schemeClr>
-              </a:solidFill>
-            </a:endParaRPr>
-          </a:p>
-        </p:txBody>
-      </p:sp>
+      </p:pic>
     </p:spTree>
     <p:extLst>
       <p:ext uri="{BB962C8B-B14F-4D97-AF65-F5344CB8AC3E}">
-        <p14:creationId xmlns:p14="http://schemas.microsoft.com/office/powerpoint/2010/main" val="3035612509"/>
+        <p14:creationId xmlns:p14="http://schemas.microsoft.com/office/powerpoint/2010/main" val="1360176711"/>
       </p:ext>
     </p:extLst>
   </p:cSld>
@@ -6296,10 +6356,10 @@
       </p:grpSpPr>
       <p:sp>
         <p:nvSpPr>
-          <p:cNvPr id="4" name="Content Placeholder 3">
+          <p:cNvPr id="3" name="Content Placeholder 2">
             <a:extLst>
               <a:ext uri="{FF2B5EF4-FFF2-40B4-BE49-F238E27FC236}">
-                <a16:creationId xmlns:a16="http://schemas.microsoft.com/office/drawing/2014/main" id="{E977BF4A-8DEA-7C9D-394F-F1DC4FDABF63}"/>
+                <a16:creationId xmlns:a16="http://schemas.microsoft.com/office/drawing/2014/main" id="{2CB9A355-61FD-8DB6-68CE-6B77BCF141CD}"/>
               </a:ext>
             </a:extLst>
           </p:cNvPr>
@@ -6307,86 +6367,150 @@
             <a:spLocks noGrp="1"/>
           </p:cNvSpPr>
           <p:nvPr>
-            <p:ph sz="half" idx="2"/>
-          </p:nvPr>
-        </p:nvSpPr>
+            <p:ph idx="1"/>
+          </p:nvPr>
+        </p:nvSpPr>
+        <p:spPr/>
+        <p:txBody>
+          <a:bodyPr anchor="t">
+            <a:normAutofit/>
+          </a:bodyPr>
+          <a:lstStyle/>
+          <a:p>
+            <a:r>
+              <a:rPr lang="en-US" sz="1600" dirty="0"/>
+              <a:t>Classification:</a:t>
+            </a:r>
+          </a:p>
+          <a:p>
+            <a:pPr lvl="1"/>
+            <a:r>
+              <a:rPr lang="en-US" sz="1400" dirty="0"/>
+              <a:t>Done using CNN with following configurations</a:t>
+            </a:r>
+          </a:p>
+          <a:p>
+            <a:pPr lvl="1"/>
+            <a:endParaRPr lang="en-US" sz="1400" dirty="0"/>
+          </a:p>
+          <a:p>
+            <a:pPr lvl="1"/>
+            <a:endParaRPr lang="en-US" sz="1400" dirty="0"/>
+          </a:p>
+          <a:p>
+            <a:pPr lvl="1"/>
+            <a:endParaRPr lang="en-US" sz="1400" dirty="0"/>
+          </a:p>
+          <a:p>
+            <a:pPr lvl="1"/>
+            <a:endParaRPr lang="en-US" sz="1400" dirty="0"/>
+          </a:p>
+          <a:p>
+            <a:pPr lvl="1"/>
+            <a:endParaRPr lang="en-US" sz="1400" dirty="0"/>
+          </a:p>
+          <a:p>
+            <a:pPr lvl="1"/>
+            <a:endParaRPr lang="en-US" sz="1400" dirty="0"/>
+          </a:p>
+          <a:p>
+            <a:pPr lvl="1"/>
+            <a:endParaRPr lang="en-US" sz="1400" dirty="0"/>
+          </a:p>
+          <a:p>
+            <a:pPr lvl="1"/>
+            <a:endParaRPr lang="en-US" sz="1400" dirty="0"/>
+          </a:p>
+          <a:p>
+            <a:pPr lvl="1"/>
+            <a:endParaRPr lang="en-US" sz="1400" dirty="0"/>
+          </a:p>
+          <a:p>
+            <a:pPr lvl="1"/>
+            <a:endParaRPr lang="en-US" sz="1400" dirty="0"/>
+          </a:p>
+          <a:p>
+            <a:endParaRPr lang="en-US" sz="1600" dirty="0"/>
+          </a:p>
+          <a:p>
+            <a:r>
+              <a:rPr lang="en-US" sz="1600" dirty="0"/>
+              <a:t>Results:</a:t>
+            </a:r>
+          </a:p>
+          <a:p>
+            <a:pPr lvl="1"/>
+            <a:r>
+              <a:rPr lang="en-US" sz="1400" dirty="0"/>
+              <a:t>LDA based image imaging along with CNN observed to performing well compared to the existing method like LASSO+SVM, tSNE + CNN.</a:t>
+            </a:r>
+          </a:p>
+        </p:txBody>
+      </p:sp>
+      <p:pic>
+        <p:nvPicPr>
+          <p:cNvPr id="4" name="Picture 3">
+            <a:extLst>
+              <a:ext uri="{FF2B5EF4-FFF2-40B4-BE49-F238E27FC236}">
+                <a16:creationId xmlns:a16="http://schemas.microsoft.com/office/drawing/2014/main" id="{D29DAFD9-48D5-C390-1FD0-9D4A10D4A485}"/>
+              </a:ext>
+            </a:extLst>
+          </p:cNvPr>
+          <p:cNvPicPr>
+            <a:picLocks noChangeAspect="1"/>
+          </p:cNvPicPr>
+          <p:nvPr/>
+        </p:nvPicPr>
+        <p:blipFill>
+          <a:blip r:embed="rId2"/>
+          <a:stretch>
+            <a:fillRect/>
+          </a:stretch>
+        </p:blipFill>
         <p:spPr>
           <a:xfrm>
-            <a:off x="3867912" y="1911096"/>
-            <a:ext cx="7772400" cy="4043200"/>
-          </a:xfrm>
-        </p:spPr>
-        <p:txBody>
-          <a:bodyPr anchor="t"/>
-          <a:lstStyle/>
-          <a:p>
-            <a:endParaRPr lang="en-US" dirty="0"/>
-          </a:p>
-        </p:txBody>
-      </p:sp>
-      <p:sp>
-        <p:nvSpPr>
-          <p:cNvPr id="9" name="TextBox 8">
-            <a:extLst>
-              <a:ext uri="{FF2B5EF4-FFF2-40B4-BE49-F238E27FC236}">
-                <a16:creationId xmlns:a16="http://schemas.microsoft.com/office/drawing/2014/main" id="{008F78EE-1CBC-BA30-6AF8-D86E756276C1}"/>
-              </a:ext>
-            </a:extLst>
-          </p:cNvPr>
-          <p:cNvSpPr txBox="1"/>
-          <p:nvPr/>
-        </p:nvSpPr>
-        <p:spPr>
-          <a:xfrm>
-            <a:off x="3867912" y="804672"/>
-            <a:ext cx="7772400" cy="984885"/>
+            <a:off x="3640668" y="1437680"/>
+            <a:ext cx="7772400" cy="2520493"/>
           </a:xfrm>
           <a:prstGeom prst="rect">
             <a:avLst/>
           </a:prstGeom>
-          <a:noFill/>
         </p:spPr>
-        <p:txBody>
-          <a:bodyPr wrap="square" rtlCol="0">
-            <a:spAutoFit/>
-          </a:bodyPr>
-          <a:lstStyle/>
-          <a:p>
-            <a:r>
-              <a:rPr lang="en-IN" sz="2200" b="0" i="0" dirty="0">
-                <a:effectLst/>
-                <a:latin typeface="Arial" panose="020B0604020202020204" pitchFamily="34" charset="0"/>
-              </a:rPr>
-              <a:t>Detection of Novel Biomarker Genes of Alzheimer’s Disease Using Gene Expression Data, </a:t>
-            </a:r>
-            <a:r>
-              <a:rPr lang="en-IN" sz="1400" b="0" i="0" dirty="0">
-                <a:solidFill>
-                  <a:schemeClr val="tx1">
-                    <a:lumMod val="65000"/>
-                    <a:lumOff val="35000"/>
-                  </a:schemeClr>
-                </a:solidFill>
-                <a:effectLst/>
-                <a:latin typeface="Arial" panose="020B0604020202020204" pitchFamily="34" charset="0"/>
-              </a:rPr>
-              <a:t>Shehan Perera, Kaveesha Hewage, Chamara Gunarathne, Rajitha Navathana, Damayanthi Herath, Roshan G. Ragel, IEEE - 2020</a:t>
-            </a:r>
-            <a:endParaRPr lang="en-US" sz="1400" dirty="0">
-              <a:solidFill>
-                <a:schemeClr val="tx1">
-                  <a:lumMod val="65000"/>
-                  <a:lumOff val="35000"/>
-                </a:schemeClr>
-              </a:solidFill>
-            </a:endParaRPr>
-          </a:p>
-        </p:txBody>
-      </p:sp>
+      </p:pic>
+      <p:pic>
+        <p:nvPicPr>
+          <p:cNvPr id="5" name="Picture 4">
+            <a:extLst>
+              <a:ext uri="{FF2B5EF4-FFF2-40B4-BE49-F238E27FC236}">
+                <a16:creationId xmlns:a16="http://schemas.microsoft.com/office/drawing/2014/main" id="{D6E54D91-EF80-BD07-B7CF-90BA016748DC}"/>
+              </a:ext>
+            </a:extLst>
+          </p:cNvPr>
+          <p:cNvPicPr>
+            <a:picLocks noChangeAspect="1"/>
+          </p:cNvPicPr>
+          <p:nvPr/>
+        </p:nvPicPr>
+        <p:blipFill>
+          <a:blip r:embed="rId3"/>
+          <a:stretch>
+            <a:fillRect/>
+          </a:stretch>
+        </p:blipFill>
+        <p:spPr>
+          <a:xfrm>
+            <a:off x="119104" y="2917429"/>
+            <a:ext cx="3106009" cy="2916939"/>
+          </a:xfrm>
+          <a:prstGeom prst="rect">
+            <a:avLst/>
+          </a:prstGeom>
+        </p:spPr>
+      </p:pic>
     </p:spTree>
     <p:extLst>
       <p:ext uri="{BB962C8B-B14F-4D97-AF65-F5344CB8AC3E}">
-        <p14:creationId xmlns:p14="http://schemas.microsoft.com/office/powerpoint/2010/main" val="3109213383"/>
+        <p14:creationId xmlns:p14="http://schemas.microsoft.com/office/powerpoint/2010/main" val="2269977810"/>
       </p:ext>
     </p:extLst>
   </p:cSld>
@@ -6431,6 +6555,333 @@
         </p:nvSpPr>
         <p:spPr>
           <a:xfrm>
+            <a:off x="3867912" y="2241034"/>
+            <a:ext cx="7772400" cy="4043200"/>
+          </a:xfrm>
+        </p:spPr>
+        <p:txBody>
+          <a:bodyPr anchor="t">
+            <a:normAutofit/>
+          </a:bodyPr>
+          <a:lstStyle/>
+          <a:p>
+            <a:r>
+              <a:rPr lang="en-US" sz="1600" dirty="0"/>
+              <a:t>Study aims to propose an automatic classification method of AD versus normal control (NC) and mild cognitive impairment (MCI) based on the magnetic resonance images (MRI).</a:t>
+            </a:r>
+          </a:p>
+          <a:p>
+            <a:r>
+              <a:rPr lang="en-US" sz="1600" dirty="0"/>
+              <a:t>Complete 3D channel form the MRI images is used as the input, which can obtain image information to the greatest extent.</a:t>
+            </a:r>
+          </a:p>
+          <a:p>
+            <a:r>
+              <a:rPr lang="en-US" sz="1600" dirty="0"/>
+              <a:t>Contrastive learning strategy based on multiple data transformation methods are used to combine supervised classification loss with the unsupervised contrastive loss.</a:t>
+            </a:r>
+          </a:p>
+          <a:p>
+            <a:r>
+              <a:rPr lang="en-US" sz="1600" dirty="0"/>
+              <a:t>Results were verified used the samples collected from ADNI dataset which showed the model’s effectiveness to classify AD and MCI samples.</a:t>
+            </a:r>
+          </a:p>
+          <a:p>
+            <a:r>
+              <a:rPr lang="en-US" sz="1600" dirty="0"/>
+              <a:t>Multichannel contrastive learning strategy greatly improved classification accuracy and generalization ability of the network.</a:t>
+            </a:r>
+          </a:p>
+        </p:txBody>
+      </p:sp>
+      <p:sp>
+        <p:nvSpPr>
+          <p:cNvPr id="9" name="TextBox 8">
+            <a:extLst>
+              <a:ext uri="{FF2B5EF4-FFF2-40B4-BE49-F238E27FC236}">
+                <a16:creationId xmlns:a16="http://schemas.microsoft.com/office/drawing/2014/main" id="{008F78EE-1CBC-BA30-6AF8-D86E756276C1}"/>
+              </a:ext>
+            </a:extLst>
+          </p:cNvPr>
+          <p:cNvSpPr txBox="1"/>
+          <p:nvPr/>
+        </p:nvSpPr>
+        <p:spPr>
+          <a:xfrm>
+            <a:off x="3867912" y="804672"/>
+            <a:ext cx="7772400" cy="984885"/>
+          </a:xfrm>
+          <a:prstGeom prst="rect">
+            <a:avLst/>
+          </a:prstGeom>
+          <a:noFill/>
+        </p:spPr>
+        <p:txBody>
+          <a:bodyPr wrap="square" rtlCol="0">
+            <a:spAutoFit/>
+          </a:bodyPr>
+          <a:lstStyle/>
+          <a:p>
+            <a:r>
+              <a:rPr lang="en-IN" sz="2200" b="0" i="0" dirty="0">
+                <a:effectLst/>
+                <a:latin typeface="+mj-lt"/>
+              </a:rPr>
+              <a:t>3-D CNN-based Multichannel Contrastive Learning for Alzheimer’s Disease Automatic Diagnosis, </a:t>
+            </a:r>
+            <a:r>
+              <a:rPr lang="en-IN" sz="1400" dirty="0">
+                <a:solidFill>
+                  <a:schemeClr val="tx1">
+                    <a:lumMod val="65000"/>
+                    <a:lumOff val="35000"/>
+                  </a:schemeClr>
+                </a:solidFill>
+                <a:latin typeface="+mj-lt"/>
+              </a:rPr>
+              <a:t>Jiaguang Li, Ying Wei, Chuyuan Wang, Quian Hu, Yue Liu, Long Xu – IEEE - 2022</a:t>
+            </a:r>
+            <a:endParaRPr lang="en-US" sz="1400" dirty="0">
+              <a:solidFill>
+                <a:schemeClr val="tx1">
+                  <a:lumMod val="65000"/>
+                  <a:lumOff val="35000"/>
+                </a:schemeClr>
+              </a:solidFill>
+              <a:latin typeface="+mj-lt"/>
+            </a:endParaRPr>
+          </a:p>
+        </p:txBody>
+      </p:sp>
+    </p:spTree>
+    <p:extLst>
+      <p:ext uri="{BB962C8B-B14F-4D97-AF65-F5344CB8AC3E}">
+        <p14:creationId xmlns:p14="http://schemas.microsoft.com/office/powerpoint/2010/main" val="3035612509"/>
+      </p:ext>
+    </p:extLst>
+  </p:cSld>
+  <p:clrMapOvr>
+    <a:masterClrMapping/>
+  </p:clrMapOvr>
+</p:sld>
+</file>
+
+<file path=ppt/slides/slide23.xml><?xml version="1.0" encoding="utf-8"?>
+<p:sld xmlns:a="http://schemas.openxmlformats.org/drawingml/2006/main" xmlns:r="http://schemas.openxmlformats.org/officeDocument/2006/relationships" xmlns:p="http://schemas.openxmlformats.org/presentationml/2006/main">
+  <p:cSld>
+    <p:spTree>
+      <p:nvGrpSpPr>
+        <p:cNvPr id="1" name=""/>
+        <p:cNvGrpSpPr/>
+        <p:nvPr/>
+      </p:nvGrpSpPr>
+      <p:grpSpPr>
+        <a:xfrm>
+          <a:off x="0" y="0"/>
+          <a:ext cx="0" cy="0"/>
+          <a:chOff x="0" y="0"/>
+          <a:chExt cx="0" cy="0"/>
+        </a:xfrm>
+      </p:grpSpPr>
+      <p:sp>
+        <p:nvSpPr>
+          <p:cNvPr id="3" name="Content Placeholder 2">
+            <a:extLst>
+              <a:ext uri="{FF2B5EF4-FFF2-40B4-BE49-F238E27FC236}">
+                <a16:creationId xmlns:a16="http://schemas.microsoft.com/office/drawing/2014/main" id="{EB67F905-DB1A-ACF6-FDA4-1E5D49EA244A}"/>
+              </a:ext>
+            </a:extLst>
+          </p:cNvPr>
+          <p:cNvSpPr>
+            <a:spLocks noGrp="1"/>
+          </p:cNvSpPr>
+          <p:nvPr>
+            <p:ph idx="1"/>
+          </p:nvPr>
+        </p:nvSpPr>
+        <p:spPr/>
+        <p:txBody>
+          <a:bodyPr anchor="t"/>
+          <a:lstStyle/>
+          <a:p>
+            <a:r>
+              <a:rPr lang="en-US" sz="1600" dirty="0"/>
+              <a:t>Self-Supervised Contrastive Learning:</a:t>
+            </a:r>
+          </a:p>
+          <a:p>
+            <a:pPr lvl="1"/>
+            <a:r>
+              <a:rPr lang="en-US" sz="1600" dirty="0"/>
+              <a:t>Was proposed to learn visual features from large-scale unlabeled images or videos by constructing pretext task without using human annotations.</a:t>
+            </a:r>
+          </a:p>
+          <a:p>
+            <a:pPr lvl="1"/>
+            <a:r>
+              <a:rPr lang="en-US" sz="1600" dirty="0"/>
+              <a:t>Constructs positive samples and negative samples through two different data transformation methods.</a:t>
+            </a:r>
+          </a:p>
+          <a:p>
+            <a:r>
+              <a:rPr lang="en-US" sz="1600" dirty="0"/>
+              <a:t>Data Preprocessing:</a:t>
+            </a:r>
+          </a:p>
+          <a:p>
+            <a:pPr lvl="1"/>
+            <a:r>
+              <a:rPr lang="en-US" sz="1600" dirty="0"/>
+              <a:t>Resample</a:t>
+            </a:r>
+          </a:p>
+          <a:p>
+            <a:pPr lvl="1"/>
+            <a:r>
+              <a:rPr lang="en-US" sz="1600" dirty="0"/>
+              <a:t>Skull Stripping</a:t>
+            </a:r>
+          </a:p>
+          <a:p>
+            <a:pPr lvl="1"/>
+            <a:r>
+              <a:rPr lang="en-US" sz="1600" dirty="0"/>
+              <a:t>Intensity correction</a:t>
+            </a:r>
+          </a:p>
+          <a:p>
+            <a:pPr lvl="1"/>
+            <a:r>
+              <a:rPr lang="en-US" sz="1600" dirty="0"/>
+              <a:t>Clip</a:t>
+            </a:r>
+          </a:p>
+          <a:p>
+            <a:r>
+              <a:rPr lang="en-US" sz="1600" dirty="0"/>
+              <a:t>Framework:</a:t>
+            </a:r>
+          </a:p>
+          <a:p>
+            <a:pPr lvl="1"/>
+            <a:endParaRPr lang="en-US" sz="1400" dirty="0"/>
+          </a:p>
+          <a:p>
+            <a:endParaRPr lang="en-US" dirty="0"/>
+          </a:p>
+        </p:txBody>
+      </p:sp>
+      <p:pic>
+        <p:nvPicPr>
+          <p:cNvPr id="4" name="Picture 3">
+            <a:extLst>
+              <a:ext uri="{FF2B5EF4-FFF2-40B4-BE49-F238E27FC236}">
+                <a16:creationId xmlns:a16="http://schemas.microsoft.com/office/drawing/2014/main" id="{DA081720-D374-D854-1E8D-9C1B84B54FE0}"/>
+              </a:ext>
+            </a:extLst>
+          </p:cNvPr>
+          <p:cNvPicPr>
+            <a:picLocks noChangeAspect="1"/>
+          </p:cNvPicPr>
+          <p:nvPr/>
+        </p:nvPicPr>
+        <p:blipFill>
+          <a:blip r:embed="rId2"/>
+          <a:stretch>
+            <a:fillRect/>
+          </a:stretch>
+        </p:blipFill>
+        <p:spPr>
+          <a:xfrm>
+            <a:off x="0" y="1944644"/>
+            <a:ext cx="3447535" cy="2627356"/>
+          </a:xfrm>
+          <a:prstGeom prst="rect">
+            <a:avLst/>
+          </a:prstGeom>
+        </p:spPr>
+      </p:pic>
+      <p:pic>
+        <p:nvPicPr>
+          <p:cNvPr id="5" name="Picture 4">
+            <a:extLst>
+              <a:ext uri="{FF2B5EF4-FFF2-40B4-BE49-F238E27FC236}">
+                <a16:creationId xmlns:a16="http://schemas.microsoft.com/office/drawing/2014/main" id="{9F7291CB-9964-AE2B-8B2E-F58F9B753B8D}"/>
+              </a:ext>
+            </a:extLst>
+          </p:cNvPr>
+          <p:cNvPicPr>
+            <a:picLocks noChangeAspect="1"/>
+          </p:cNvPicPr>
+          <p:nvPr/>
+        </p:nvPicPr>
+        <p:blipFill>
+          <a:blip r:embed="rId3"/>
+          <a:stretch>
+            <a:fillRect/>
+          </a:stretch>
+        </p:blipFill>
+        <p:spPr>
+          <a:xfrm>
+            <a:off x="5348304" y="3692618"/>
+            <a:ext cx="5836164" cy="2596971"/>
+          </a:xfrm>
+          <a:prstGeom prst="rect">
+            <a:avLst/>
+          </a:prstGeom>
+        </p:spPr>
+      </p:pic>
+    </p:spTree>
+    <p:extLst>
+      <p:ext uri="{BB962C8B-B14F-4D97-AF65-F5344CB8AC3E}">
+        <p14:creationId xmlns:p14="http://schemas.microsoft.com/office/powerpoint/2010/main" val="590845056"/>
+      </p:ext>
+    </p:extLst>
+  </p:cSld>
+  <p:clrMapOvr>
+    <a:masterClrMapping/>
+  </p:clrMapOvr>
+</p:sld>
+</file>
+
+<file path=ppt/slides/slide24.xml><?xml version="1.0" encoding="utf-8"?>
+<p:sld xmlns:a="http://schemas.openxmlformats.org/drawingml/2006/main" xmlns:r="http://schemas.openxmlformats.org/officeDocument/2006/relationships" xmlns:p="http://schemas.openxmlformats.org/presentationml/2006/main">
+  <p:cSld>
+    <p:spTree>
+      <p:nvGrpSpPr>
+        <p:cNvPr id="1" name=""/>
+        <p:cNvGrpSpPr/>
+        <p:nvPr/>
+      </p:nvGrpSpPr>
+      <p:grpSpPr>
+        <a:xfrm>
+          <a:off x="0" y="0"/>
+          <a:ext cx="0" cy="0"/>
+          <a:chOff x="0" y="0"/>
+          <a:chExt cx="0" cy="0"/>
+        </a:xfrm>
+      </p:grpSpPr>
+      <p:sp>
+        <p:nvSpPr>
+          <p:cNvPr id="4" name="Content Placeholder 3">
+            <a:extLst>
+              <a:ext uri="{FF2B5EF4-FFF2-40B4-BE49-F238E27FC236}">
+                <a16:creationId xmlns:a16="http://schemas.microsoft.com/office/drawing/2014/main" id="{E977BF4A-8DEA-7C9D-394F-F1DC4FDABF63}"/>
+              </a:ext>
+            </a:extLst>
+          </p:cNvPr>
+          <p:cNvSpPr>
+            <a:spLocks noGrp="1"/>
+          </p:cNvSpPr>
+          <p:nvPr>
+            <p:ph sz="half" idx="2"/>
+          </p:nvPr>
+        </p:nvSpPr>
+        <p:spPr>
+          <a:xfrm>
             <a:off x="3867912" y="1911096"/>
             <a:ext cx="7772400" cy="4043200"/>
           </a:xfrm>
@@ -6505,7 +6956,364 @@
     </p:spTree>
     <p:extLst>
       <p:ext uri="{BB962C8B-B14F-4D97-AF65-F5344CB8AC3E}">
+        <p14:creationId xmlns:p14="http://schemas.microsoft.com/office/powerpoint/2010/main" val="3109213383"/>
+      </p:ext>
+    </p:extLst>
+  </p:cSld>
+  <p:clrMapOvr>
+    <a:masterClrMapping/>
+  </p:clrMapOvr>
+</p:sld>
+</file>
+
+<file path=ppt/slides/slide25.xml><?xml version="1.0" encoding="utf-8"?>
+<p:sld xmlns:a="http://schemas.openxmlformats.org/drawingml/2006/main" xmlns:r="http://schemas.openxmlformats.org/officeDocument/2006/relationships" xmlns:p="http://schemas.openxmlformats.org/presentationml/2006/main">
+  <p:cSld>
+    <p:spTree>
+      <p:nvGrpSpPr>
+        <p:cNvPr id="1" name=""/>
+        <p:cNvGrpSpPr/>
+        <p:nvPr/>
+      </p:nvGrpSpPr>
+      <p:grpSpPr>
+        <a:xfrm>
+          <a:off x="0" y="0"/>
+          <a:ext cx="0" cy="0"/>
+          <a:chOff x="0" y="0"/>
+          <a:chExt cx="0" cy="0"/>
+        </a:xfrm>
+      </p:grpSpPr>
+      <p:sp>
+        <p:nvSpPr>
+          <p:cNvPr id="4" name="Content Placeholder 3">
+            <a:extLst>
+              <a:ext uri="{FF2B5EF4-FFF2-40B4-BE49-F238E27FC236}">
+                <a16:creationId xmlns:a16="http://schemas.microsoft.com/office/drawing/2014/main" id="{E977BF4A-8DEA-7C9D-394F-F1DC4FDABF63}"/>
+              </a:ext>
+            </a:extLst>
+          </p:cNvPr>
+          <p:cNvSpPr>
+            <a:spLocks noGrp="1"/>
+          </p:cNvSpPr>
+          <p:nvPr>
+            <p:ph sz="half" idx="2"/>
+          </p:nvPr>
+        </p:nvSpPr>
+        <p:spPr>
+          <a:xfrm>
+            <a:off x="3867912" y="1911096"/>
+            <a:ext cx="7772400" cy="4043200"/>
+          </a:xfrm>
+        </p:spPr>
+        <p:txBody>
+          <a:bodyPr anchor="t"/>
+          <a:lstStyle/>
+          <a:p>
+            <a:endParaRPr lang="en-US" dirty="0"/>
+          </a:p>
+        </p:txBody>
+      </p:sp>
+      <p:sp>
+        <p:nvSpPr>
+          <p:cNvPr id="9" name="TextBox 8">
+            <a:extLst>
+              <a:ext uri="{FF2B5EF4-FFF2-40B4-BE49-F238E27FC236}">
+                <a16:creationId xmlns:a16="http://schemas.microsoft.com/office/drawing/2014/main" id="{008F78EE-1CBC-BA30-6AF8-D86E756276C1}"/>
+              </a:ext>
+            </a:extLst>
+          </p:cNvPr>
+          <p:cNvSpPr txBox="1"/>
+          <p:nvPr/>
+        </p:nvSpPr>
+        <p:spPr>
+          <a:xfrm>
+            <a:off x="3867912" y="804672"/>
+            <a:ext cx="7772400" cy="984885"/>
+          </a:xfrm>
+          <a:prstGeom prst="rect">
+            <a:avLst/>
+          </a:prstGeom>
+          <a:noFill/>
+        </p:spPr>
+        <p:txBody>
+          <a:bodyPr wrap="square" rtlCol="0">
+            <a:spAutoFit/>
+          </a:bodyPr>
+          <a:lstStyle/>
+          <a:p>
+            <a:r>
+              <a:rPr lang="en-IN" sz="2200" b="0" i="0" dirty="0">
+                <a:effectLst/>
+                <a:latin typeface="Arial" panose="020B0604020202020204" pitchFamily="34" charset="0"/>
+              </a:rPr>
+              <a:t>Detection of Novel Biomarker Genes of Alzheimer’s Disease Using Gene Expression Data, </a:t>
+            </a:r>
+            <a:r>
+              <a:rPr lang="en-IN" sz="1400" b="0" i="0" dirty="0">
+                <a:solidFill>
+                  <a:schemeClr val="tx1">
+                    <a:lumMod val="65000"/>
+                    <a:lumOff val="35000"/>
+                  </a:schemeClr>
+                </a:solidFill>
+                <a:effectLst/>
+                <a:latin typeface="Arial" panose="020B0604020202020204" pitchFamily="34" charset="0"/>
+              </a:rPr>
+              <a:t>Shehan Perera, Kaveesha Hewage, Chamara Gunarathne, Rajitha Navathana, Damayanthi Herath, Roshan G. Ragel, IEEE - 2020</a:t>
+            </a:r>
+            <a:endParaRPr lang="en-US" sz="1400" dirty="0">
+              <a:solidFill>
+                <a:schemeClr val="tx1">
+                  <a:lumMod val="65000"/>
+                  <a:lumOff val="35000"/>
+                </a:schemeClr>
+              </a:solidFill>
+            </a:endParaRPr>
+          </a:p>
+        </p:txBody>
+      </p:sp>
+    </p:spTree>
+    <p:extLst>
+      <p:ext uri="{BB962C8B-B14F-4D97-AF65-F5344CB8AC3E}">
         <p14:creationId xmlns:p14="http://schemas.microsoft.com/office/powerpoint/2010/main" val="2335058404"/>
+      </p:ext>
+    </p:extLst>
+  </p:cSld>
+  <p:clrMapOvr>
+    <a:masterClrMapping/>
+  </p:clrMapOvr>
+</p:sld>
+</file>
+
+<file path=ppt/slides/slide26.xml><?xml version="1.0" encoding="utf-8"?>
+<p:sld xmlns:a="http://schemas.openxmlformats.org/drawingml/2006/main" xmlns:r="http://schemas.openxmlformats.org/officeDocument/2006/relationships" xmlns:p="http://schemas.openxmlformats.org/presentationml/2006/main">
+  <p:cSld>
+    <p:spTree>
+      <p:nvGrpSpPr>
+        <p:cNvPr id="1" name=""/>
+        <p:cNvGrpSpPr/>
+        <p:nvPr/>
+      </p:nvGrpSpPr>
+      <p:grpSpPr>
+        <a:xfrm>
+          <a:off x="0" y="0"/>
+          <a:ext cx="0" cy="0"/>
+          <a:chOff x="0" y="0"/>
+          <a:chExt cx="0" cy="0"/>
+        </a:xfrm>
+      </p:grpSpPr>
+      <p:sp>
+        <p:nvSpPr>
+          <p:cNvPr id="4" name="Content Placeholder 3">
+            <a:extLst>
+              <a:ext uri="{FF2B5EF4-FFF2-40B4-BE49-F238E27FC236}">
+                <a16:creationId xmlns:a16="http://schemas.microsoft.com/office/drawing/2014/main" id="{E977BF4A-8DEA-7C9D-394F-F1DC4FDABF63}"/>
+              </a:ext>
+            </a:extLst>
+          </p:cNvPr>
+          <p:cNvSpPr>
+            <a:spLocks noGrp="1"/>
+          </p:cNvSpPr>
+          <p:nvPr>
+            <p:ph sz="half" idx="2"/>
+          </p:nvPr>
+        </p:nvSpPr>
+        <p:spPr>
+          <a:xfrm>
+            <a:off x="3867912" y="1911096"/>
+            <a:ext cx="7772400" cy="4043200"/>
+          </a:xfrm>
+        </p:spPr>
+        <p:txBody>
+          <a:bodyPr anchor="t"/>
+          <a:lstStyle/>
+          <a:p>
+            <a:endParaRPr lang="en-US" dirty="0"/>
+          </a:p>
+        </p:txBody>
+      </p:sp>
+      <p:sp>
+        <p:nvSpPr>
+          <p:cNvPr id="9" name="TextBox 8">
+            <a:extLst>
+              <a:ext uri="{FF2B5EF4-FFF2-40B4-BE49-F238E27FC236}">
+                <a16:creationId xmlns:a16="http://schemas.microsoft.com/office/drawing/2014/main" id="{008F78EE-1CBC-BA30-6AF8-D86E756276C1}"/>
+              </a:ext>
+            </a:extLst>
+          </p:cNvPr>
+          <p:cNvSpPr txBox="1"/>
+          <p:nvPr/>
+        </p:nvSpPr>
+        <p:spPr>
+          <a:xfrm>
+            <a:off x="3867912" y="804672"/>
+            <a:ext cx="7772400" cy="984885"/>
+          </a:xfrm>
+          <a:prstGeom prst="rect">
+            <a:avLst/>
+          </a:prstGeom>
+          <a:noFill/>
+        </p:spPr>
+        <p:txBody>
+          <a:bodyPr wrap="square" rtlCol="0">
+            <a:spAutoFit/>
+          </a:bodyPr>
+          <a:lstStyle/>
+          <a:p>
+            <a:r>
+              <a:rPr lang="en-IN" sz="2200" b="0" i="0" dirty="0">
+                <a:effectLst/>
+                <a:latin typeface="Arial" panose="020B0604020202020204" pitchFamily="34" charset="0"/>
+              </a:rPr>
+              <a:t>Detection of Novel Biomarker Genes of Alzheimer’s Disease Using Gene Expression Data, </a:t>
+            </a:r>
+            <a:r>
+              <a:rPr lang="en-IN" sz="1400" b="0" i="0" dirty="0">
+                <a:solidFill>
+                  <a:schemeClr val="tx1">
+                    <a:lumMod val="65000"/>
+                    <a:lumOff val="35000"/>
+                  </a:schemeClr>
+                </a:solidFill>
+                <a:effectLst/>
+                <a:latin typeface="Arial" panose="020B0604020202020204" pitchFamily="34" charset="0"/>
+              </a:rPr>
+              <a:t>Shehan Perera, Kaveesha Hewage, Chamara Gunarathne, Rajitha Navathana, Damayanthi Herath, Roshan G. Ragel, IEEE - 2020</a:t>
+            </a:r>
+            <a:endParaRPr lang="en-US" sz="1400" dirty="0">
+              <a:solidFill>
+                <a:schemeClr val="tx1">
+                  <a:lumMod val="65000"/>
+                  <a:lumOff val="35000"/>
+                </a:schemeClr>
+              </a:solidFill>
+            </a:endParaRPr>
+          </a:p>
+        </p:txBody>
+      </p:sp>
+    </p:spTree>
+    <p:extLst>
+      <p:ext uri="{BB962C8B-B14F-4D97-AF65-F5344CB8AC3E}">
+        <p14:creationId xmlns:p14="http://schemas.microsoft.com/office/powerpoint/2010/main" val="1157597906"/>
+      </p:ext>
+    </p:extLst>
+  </p:cSld>
+  <p:clrMapOvr>
+    <a:masterClrMapping/>
+  </p:clrMapOvr>
+</p:sld>
+</file>
+
+<file path=ppt/slides/slide27.xml><?xml version="1.0" encoding="utf-8"?>
+<p:sld xmlns:a="http://schemas.openxmlformats.org/drawingml/2006/main" xmlns:r="http://schemas.openxmlformats.org/officeDocument/2006/relationships" xmlns:p="http://schemas.openxmlformats.org/presentationml/2006/main">
+  <p:cSld>
+    <p:spTree>
+      <p:nvGrpSpPr>
+        <p:cNvPr id="1" name=""/>
+        <p:cNvGrpSpPr/>
+        <p:nvPr/>
+      </p:nvGrpSpPr>
+      <p:grpSpPr>
+        <a:xfrm>
+          <a:off x="0" y="0"/>
+          <a:ext cx="0" cy="0"/>
+          <a:chOff x="0" y="0"/>
+          <a:chExt cx="0" cy="0"/>
+        </a:xfrm>
+      </p:grpSpPr>
+      <p:sp>
+        <p:nvSpPr>
+          <p:cNvPr id="4" name="Content Placeholder 3">
+            <a:extLst>
+              <a:ext uri="{FF2B5EF4-FFF2-40B4-BE49-F238E27FC236}">
+                <a16:creationId xmlns:a16="http://schemas.microsoft.com/office/drawing/2014/main" id="{E977BF4A-8DEA-7C9D-394F-F1DC4FDABF63}"/>
+              </a:ext>
+            </a:extLst>
+          </p:cNvPr>
+          <p:cNvSpPr>
+            <a:spLocks noGrp="1"/>
+          </p:cNvSpPr>
+          <p:nvPr>
+            <p:ph sz="half" idx="2"/>
+          </p:nvPr>
+        </p:nvSpPr>
+        <p:spPr>
+          <a:xfrm>
+            <a:off x="3867912" y="1911096"/>
+            <a:ext cx="7772400" cy="4043200"/>
+          </a:xfrm>
+        </p:spPr>
+        <p:txBody>
+          <a:bodyPr anchor="t"/>
+          <a:lstStyle/>
+          <a:p>
+            <a:endParaRPr lang="en-US" dirty="0"/>
+          </a:p>
+        </p:txBody>
+      </p:sp>
+      <p:sp>
+        <p:nvSpPr>
+          <p:cNvPr id="9" name="TextBox 8">
+            <a:extLst>
+              <a:ext uri="{FF2B5EF4-FFF2-40B4-BE49-F238E27FC236}">
+                <a16:creationId xmlns:a16="http://schemas.microsoft.com/office/drawing/2014/main" id="{008F78EE-1CBC-BA30-6AF8-D86E756276C1}"/>
+              </a:ext>
+            </a:extLst>
+          </p:cNvPr>
+          <p:cNvSpPr txBox="1"/>
+          <p:nvPr/>
+        </p:nvSpPr>
+        <p:spPr>
+          <a:xfrm>
+            <a:off x="3867912" y="804672"/>
+            <a:ext cx="7772400" cy="984885"/>
+          </a:xfrm>
+          <a:prstGeom prst="rect">
+            <a:avLst/>
+          </a:prstGeom>
+          <a:noFill/>
+        </p:spPr>
+        <p:txBody>
+          <a:bodyPr wrap="square" rtlCol="0">
+            <a:spAutoFit/>
+          </a:bodyPr>
+          <a:lstStyle/>
+          <a:p>
+            <a:r>
+              <a:rPr lang="en-IN" sz="2200" b="0" i="0" dirty="0">
+                <a:effectLst/>
+                <a:latin typeface="Arial" panose="020B0604020202020204" pitchFamily="34" charset="0"/>
+              </a:rPr>
+              <a:t>Detection of Novel Biomarker Genes of Alzheimer’s Disease Using Gene Expression Data, </a:t>
+            </a:r>
+            <a:r>
+              <a:rPr lang="en-IN" sz="1400" b="0" i="0" dirty="0">
+                <a:solidFill>
+                  <a:schemeClr val="tx1">
+                    <a:lumMod val="65000"/>
+                    <a:lumOff val="35000"/>
+                  </a:schemeClr>
+                </a:solidFill>
+                <a:effectLst/>
+                <a:latin typeface="Arial" panose="020B0604020202020204" pitchFamily="34" charset="0"/>
+              </a:rPr>
+              <a:t>Shehan Perera, Kaveesha Hewage, Chamara Gunarathne, Rajitha Navathana, Damayanthi Herath, Roshan G. Ragel, IEEE - 2020</a:t>
+            </a:r>
+            <a:endParaRPr lang="en-US" sz="1400" dirty="0">
+              <a:solidFill>
+                <a:schemeClr val="tx1">
+                  <a:lumMod val="65000"/>
+                  <a:lumOff val="35000"/>
+                </a:schemeClr>
+              </a:solidFill>
+            </a:endParaRPr>
+          </a:p>
+        </p:txBody>
+      </p:sp>
+    </p:spTree>
+    <p:extLst>
+      <p:ext uri="{BB962C8B-B14F-4D97-AF65-F5344CB8AC3E}">
+        <p14:creationId xmlns:p14="http://schemas.microsoft.com/office/powerpoint/2010/main" val="2458998729"/>
       </p:ext>
     </p:extLst>
   </p:cSld>
@@ -8527,8 +9335,8 @@
         </p:blipFill>
         <p:spPr>
           <a:xfrm>
-            <a:off x="622549" y="1346420"/>
-            <a:ext cx="3854945" cy="1069746"/>
+            <a:off x="559139" y="912563"/>
+            <a:ext cx="3981763" cy="1923068"/>
           </a:xfrm>
           <a:prstGeom prst="rect">
             <a:avLst/>

</xml_diff>